<commit_message>
Úprava modelu - distribuční jednotky
</commit_message>
<xml_diff>
--- a/Business-model/KaPoRyZe.pptx
+++ b/Business-model/KaPoRyZe.pptx
@@ -208,7 +208,7 @@
           <a:p>
             <a:fld id="{055514E0-CE4C-4898-9229-517E1CB0A697}" type="datetimeFigureOut">
               <a:rPr lang="en-GB" smtClean="0"/>
-              <a:t>04/10/2016</a:t>
+              <a:t>13/10/2016</a:t>
             </a:fld>
             <a:endParaRPr lang="en-GB"/>
           </a:p>
@@ -3996,9 +3996,18 @@
           <a:lstStyle/>
           <a:p>
             <a:r>
-              <a:rPr lang="en-US"/>
-              <a:t>Distribuční kanály</a:t>
-            </a:r>
+              <a:rPr lang="en-US" dirty="0" err="1"/>
+              <a:t>Distribuční</a:t>
+            </a:r>
+            <a:r>
+              <a:rPr lang="en-US" dirty="0"/>
+              <a:t> </a:t>
+            </a:r>
+            <a:r>
+              <a:rPr lang="en-US" dirty="0" err="1"/>
+              <a:t>kanály</a:t>
+            </a:r>
+            <a:endParaRPr lang="en-US" dirty="0"/>
           </a:p>
         </p:txBody>
       </p:sp>
@@ -4442,7 +4451,7 @@
         </p:nvSpPr>
         <p:spPr>
           <a:xfrm>
-            <a:off x="5600700" y="3352800"/>
+            <a:off x="6000372" y="3400239"/>
             <a:ext cx="762000" cy="508000"/>
           </a:xfrm>
           <a:prstGeom prst="rect">
@@ -4467,13 +4476,13 @@
           <a:p>
             <a:pPr algn="ctr"/>
             <a:r>
-              <a:rPr lang="en-US" sz="800" b="1" dirty="0" err="1">
+              <a:rPr lang="cs-CZ" sz="800" b="1" dirty="0">
                 <a:solidFill>
                   <a:srgbClr val="000000"/>
                 </a:solidFill>
                 <a:latin typeface="Helvetica"/>
               </a:rPr>
-              <a:t>Časopis</a:t>
+              <a:t>Internet</a:t>
             </a:r>
             <a:endParaRPr lang="en-US" sz="800" b="1" dirty="0">
               <a:solidFill>
@@ -4605,7 +4614,7 @@
           <a:p>
             <a:pPr algn="ctr"/>
             <a:r>
-              <a:rPr lang="en-US" sz="800" b="1">
+              <a:rPr lang="en-US" sz="800" b="1" dirty="0">
                 <a:solidFill>
                   <a:srgbClr val="000000"/>
                 </a:solidFill>
@@ -4855,14 +4864,14 @@
       </p:sp>
       <p:sp>
         <p:nvSpPr>
-          <p:cNvPr id="26" name="AutoShape 25"/>
+          <p:cNvPr id="27" name="AutoShape 26"/>
           <p:cNvSpPr/>
           <p:nvPr/>
         </p:nvSpPr>
         <p:spPr>
           <a:xfrm>
-            <a:off x="6451600" y="3365500"/>
-            <a:ext cx="762000" cy="508000"/>
+            <a:off x="4914900" y="5854700"/>
+            <a:ext cx="1054100" cy="508000"/>
           </a:xfrm>
           <a:prstGeom prst="rect">
             <a:avLst/>
@@ -4886,50 +4895,6 @@
           <a:p>
             <a:pPr algn="ctr"/>
             <a:r>
-              <a:rPr lang="en-US" sz="800" b="1">
-                <a:solidFill>
-                  <a:srgbClr val="000000"/>
-                </a:solidFill>
-                <a:latin typeface="Helvetica"/>
-              </a:rPr>
-              <a:t>Bannerová reklama</a:t>
-            </a:r>
-          </a:p>
-        </p:txBody>
-      </p:sp>
-      <p:sp>
-        <p:nvSpPr>
-          <p:cNvPr id="27" name="AutoShape 26"/>
-          <p:cNvSpPr/>
-          <p:nvPr/>
-        </p:nvSpPr>
-        <p:spPr>
-          <a:xfrm>
-            <a:off x="4914900" y="5854700"/>
-            <a:ext cx="1054100" cy="508000"/>
-          </a:xfrm>
-          <a:prstGeom prst="rect">
-            <a:avLst/>
-          </a:prstGeom>
-          <a:solidFill>
-            <a:srgbClr val="FFEB64"/>
-          </a:solidFill>
-          <a:effectLst>
-            <a:outerShdw blurRad="50800" dist="38100" dir="2700000" rotWithShape="0">
-              <a:prstClr val="black">
-                <a:alpha val="40000"/>
-              </a:prstClr>
-            </a:outerShdw>
-          </a:effectLst>
-        </p:spPr>
-        <p:txBody>
-          <a:bodyPr wrap="square" anchor="ctr">
-            <a:normAutofit/>
-          </a:bodyPr>
-          <a:lstStyle/>
-          <a:p>
-            <a:pPr algn="ctr"/>
-            <a:r>
               <a:rPr lang="en-US" sz="800" b="1" dirty="0" err="1">
                 <a:solidFill>
                   <a:srgbClr val="000000"/>
@@ -4962,50 +4927,6 @@
               </a:solidFill>
               <a:latin typeface="Helvetica"/>
             </a:endParaRPr>
-          </a:p>
-        </p:txBody>
-      </p:sp>
-      <p:sp>
-        <p:nvSpPr>
-          <p:cNvPr id="28" name="AutoShape 27"/>
-          <p:cNvSpPr/>
-          <p:nvPr/>
-        </p:nvSpPr>
-        <p:spPr>
-          <a:xfrm>
-            <a:off x="5664200" y="4140200"/>
-            <a:ext cx="762000" cy="508000"/>
-          </a:xfrm>
-          <a:prstGeom prst="rect">
-            <a:avLst/>
-          </a:prstGeom>
-          <a:solidFill>
-            <a:srgbClr val="FFEB64"/>
-          </a:solidFill>
-          <a:effectLst>
-            <a:outerShdw blurRad="50800" dist="38100" dir="2700000" rotWithShape="0">
-              <a:prstClr val="black">
-                <a:alpha val="40000"/>
-              </a:prstClr>
-            </a:outerShdw>
-          </a:effectLst>
-        </p:spPr>
-        <p:txBody>
-          <a:bodyPr wrap="square" anchor="ctr">
-            <a:normAutofit/>
-          </a:bodyPr>
-          <a:lstStyle/>
-          <a:p>
-            <a:pPr algn="ctr"/>
-            <a:r>
-              <a:rPr lang="en-US" sz="800" b="1">
-                <a:solidFill>
-                  <a:srgbClr val="000000"/>
-                </a:solidFill>
-                <a:latin typeface="Helvetica"/>
-              </a:rPr>
-              <a:t>PPC reklama</a:t>
-            </a:r>
           </a:p>
         </p:txBody>
       </p:sp>

</xml_diff>